<commit_message>
Added outputs for pathway analysis and downstream analysis
</commit_message>
<xml_diff>
--- a/pathway_analysis/files/MetaPathways_Tutorial_Pathway_Analysis.pptx
+++ b/pathway_analysis/files/MetaPathways_Tutorial_Pathway_Analysis.pptx
@@ -285,7 +285,7 @@
             </a:pPr>
             <a:fld id="{AA49B741-88AC-6046-8125-575B19BFA23B}" type="datetime1">
               <a:rPr lang="en-CA" smtClean="0"/>
-              <a:t>14-02-09</a:t>
+              <a:t>14-02-10</a:t>
             </a:fld>
             <a:endParaRPr lang="en-US"/>
           </a:p>
@@ -506,7 +506,7 @@
             </a:pPr>
             <a:fld id="{3CD34768-8411-9743-9214-14D42A6AC634}" type="datetime1">
               <a:rPr lang="en-CA" smtClean="0"/>
-              <a:t>14-02-09</a:t>
+              <a:t>14-02-10</a:t>
             </a:fld>
             <a:endParaRPr lang="en-US"/>
           </a:p>
@@ -14843,19 +14843,8 @@
                 <a:ea typeface="ＭＳ Ｐゴシック" pitchFamily="-111" charset="-128"/>
                 <a:cs typeface="ＭＳ Ｐゴシック" pitchFamily="-111" charset="-128"/>
               </a:rPr>
-              <a:t>Ph.D. </a:t>
-            </a:r>
-            <a:r>
-              <a:rPr lang="en-US" sz="1800" dirty="0" smtClean="0">
-                <a:ea typeface="ＭＳ Ｐゴシック" pitchFamily="-111" charset="-128"/>
-                <a:cs typeface="ＭＳ Ｐゴシック" pitchFamily="-111" charset="-128"/>
-              </a:rPr>
-              <a:t>Candidate Bioinformatics</a:t>
-            </a:r>
-            <a:endParaRPr lang="en-US" sz="1800" dirty="0" smtClean="0">
-              <a:ea typeface="ＭＳ Ｐゴシック" pitchFamily="-111" charset="-128"/>
-              <a:cs typeface="ＭＳ Ｐゴシック" pitchFamily="-111" charset="-128"/>
-            </a:endParaRPr>
+              <a:t>Ph.D. Candidate Bioinformatics</a:t>
+            </a:r>
           </a:p>
           <a:p>
             <a:pPr marL="0" indent="0" algn="ctr">
@@ -14919,10 +14908,6 @@
               </a:rPr>
               <a:t> Workshop</a:t>
             </a:r>
-            <a:endParaRPr lang="en-US" sz="1800" dirty="0" smtClean="0">
-              <a:ea typeface="ＭＳ Ｐゴシック" pitchFamily="-111" charset="-128"/>
-              <a:cs typeface="ＭＳ Ｐゴシック" pitchFamily="-111" charset="-128"/>
-            </a:endParaRPr>
           </a:p>
           <a:p>
             <a:pPr marL="0" indent="0" algn="ctr">
@@ -17780,7 +17765,7 @@
         <p:spPr>
           <a:xfrm>
             <a:off x="469504" y="3901698"/>
-            <a:ext cx="8711008" cy="2308324"/>
+            <a:ext cx="8711008" cy="2154436"/>
           </a:xfrm>
           <a:prstGeom prst="rect">
             <a:avLst/>
@@ -17885,27 +17870,11 @@
           </a:p>
           <a:p>
             <a:r>
-              <a:rPr lang="en-US" sz="1000" dirty="0" smtClean="0">
-                <a:latin typeface="Courier"/>
-                <a:cs typeface="Courier"/>
-              </a:rPr>
-              <a:t>PWY	1_upper_euphotic	6_upper_euphotic	2_chlorophyllmax	3_below_euphotic	5_uppermesopelagic	7_omz	4_deepabyss</a:t>
-            </a:r>
-          </a:p>
-          <a:p>
-            <a:r>
-              <a:rPr lang="en-US" sz="1000" dirty="0" smtClean="0">
-                <a:latin typeface="Courier"/>
-                <a:cs typeface="Courier"/>
-              </a:rPr>
-              <a:t>SUCSYN</a:t>
-            </a:r>
-            <a:r>
               <a:rPr lang="en-US" sz="1000" dirty="0">
                 <a:latin typeface="Courier"/>
                 <a:cs typeface="Courier"/>
               </a:rPr>
-              <a:t>-PWY	0	16	10	8	17	13	16</a:t>
+              <a:t>RXN	1_upper_euphotic	6_upper_euphotic	2_chlorophyllmax	3_below_euphotic	5_uppermesopelagic	7_omz	4_deepabyss</a:t>
             </a:r>
           </a:p>
           <a:p>
@@ -17914,7 +17883,7 @@
                 <a:latin typeface="Courier"/>
                 <a:cs typeface="Courier"/>
               </a:rPr>
-              <a:t>PWY-6733	0	1	0	0	0	0	0</a:t>
+              <a:t>1.7.7.2-RXN	0	0	2	0	0	1	1</a:t>
             </a:r>
           </a:p>
           <a:p>
@@ -17923,7 +17892,7 @@
                 <a:latin typeface="Courier"/>
                 <a:cs typeface="Courier"/>
               </a:rPr>
-              <a:t>PWY-5274	0	0	0	1	0	0	0</a:t>
+              <a:t>PPGPPSYN-RXN	0	1	0	0	0	0	0</a:t>
             </a:r>
           </a:p>
           <a:p>
@@ -17932,7 +17901,7 @@
                 <a:latin typeface="Courier"/>
                 <a:cs typeface="Courier"/>
               </a:rPr>
-              <a:t>PWY-6728	0	0	0	46	0	59	0</a:t>
+              <a:t>RXN-6641	1	0	1	0	1	3	2</a:t>
             </a:r>
           </a:p>
           <a:p>
@@ -17941,7 +17910,7 @@
                 <a:latin typeface="Courier"/>
                 <a:cs typeface="Courier"/>
               </a:rPr>
-              <a:t>PWY-241	12	6	8	6	7	12	7</a:t>
+              <a:t>RXN3DJ-170	1	0	0	0	0	0	2</a:t>
             </a:r>
           </a:p>
         </p:txBody>
@@ -18530,11 +18499,7 @@
             </a:pPr>
             <a:r>
               <a:rPr lang="en-US" dirty="0" smtClean="0"/>
-              <a:t>ORF </a:t>
-            </a:r>
-            <a:r>
-              <a:rPr lang="en-US" dirty="0" smtClean="0"/>
-              <a:t>Abundance Tables</a:t>
+              <a:t>ORF Abundance Tables</a:t>
             </a:r>
             <a:r>
               <a:rPr lang="en-US" dirty="0"/>
@@ -21467,11 +21432,7 @@
             </a:pPr>
             <a:r>
               <a:rPr lang="en-US" sz="2400" b="1" dirty="0" smtClean="0"/>
-              <a:t>2. </a:t>
-            </a:r>
-            <a:r>
-              <a:rPr lang="en-US" sz="2400" b="1" dirty="0" smtClean="0"/>
-              <a:t>Loading </a:t>
+              <a:t>2. Loading </a:t>
             </a:r>
             <a:r>
               <a:rPr lang="en-US" sz="2400" b="1" dirty="0" err="1" smtClean="0"/>
@@ -21485,7 +21446,6 @@
               <a:rPr lang="en-US" sz="2400" b="1" dirty="0"/>
               <a:t>into Pathway Tools</a:t>
             </a:r>
-            <a:endParaRPr lang="en-US" sz="2400" b="1" dirty="0"/>
           </a:p>
         </p:txBody>
       </p:sp>

</xml_diff>

<commit_message>
Updated Pathway Analysis slides
</commit_message>
<xml_diff>
--- a/pathway_analysis/files/MetaPathways_Tutorial_Pathway_Analysis.pptx
+++ b/pathway_analysis/files/MetaPathways_Tutorial_Pathway_Analysis.pptx
@@ -14947,6 +14947,74 @@
           </a:p>
         </p:txBody>
       </p:sp>
+      <p:sp>
+        <p:nvSpPr>
+          <p:cNvPr id="2" name="TextBox 1"/>
+          <p:cNvSpPr txBox="1"/>
+          <p:nvPr/>
+        </p:nvSpPr>
+        <p:spPr>
+          <a:xfrm>
+            <a:off x="1763688" y="6208638"/>
+            <a:ext cx="5436836" cy="292388"/>
+          </a:xfrm>
+          <a:prstGeom prst="rect">
+            <a:avLst/>
+          </a:prstGeom>
+          <a:noFill/>
+        </p:spPr>
+        <p:txBody>
+          <a:bodyPr wrap="none" rtlCol="0">
+            <a:spAutoFit/>
+          </a:bodyPr>
+          <a:lstStyle/>
+          <a:p>
+            <a:r>
+              <a:rPr lang="en-US" sz="1300" b="1" dirty="0">
+                <a:hlinkClick r:id="rId3"/>
+              </a:rPr>
+              <a:t>https://</a:t>
+            </a:r>
+            <a:r>
+              <a:rPr lang="en-US" sz="1300" b="1" dirty="0" err="1">
+                <a:hlinkClick r:id="rId3"/>
+              </a:rPr>
+              <a:t>github.com</a:t>
+            </a:r>
+            <a:r>
+              <a:rPr lang="en-US" sz="1300" b="1" dirty="0">
+                <a:hlinkClick r:id="rId3"/>
+              </a:rPr>
+              <a:t>/</a:t>
+            </a:r>
+            <a:r>
+              <a:rPr lang="en-US" sz="1300" b="1" dirty="0" err="1">
+                <a:hlinkClick r:id="rId3"/>
+              </a:rPr>
+              <a:t>nielshanson</a:t>
+            </a:r>
+            <a:r>
+              <a:rPr lang="en-US" sz="1300" b="1" dirty="0">
+                <a:hlinkClick r:id="rId3"/>
+              </a:rPr>
+              <a:t>/</a:t>
+            </a:r>
+            <a:r>
+              <a:rPr lang="en-US" sz="1300" b="1" dirty="0" err="1">
+                <a:hlinkClick r:id="rId3"/>
+              </a:rPr>
+              <a:t>mp_tutorial</a:t>
+            </a:r>
+            <a:r>
+              <a:rPr lang="en-US" sz="1300" b="1" dirty="0">
+                <a:hlinkClick r:id="rId3"/>
+              </a:rPr>
+              <a:t>/wiki/Pathway-Analysis</a:t>
+            </a:r>
+            <a:endParaRPr lang="en-US" sz="1300" b="1" dirty="0"/>
+          </a:p>
+        </p:txBody>
+      </p:sp>
     </p:spTree>
     <p:extLst>
       <p:ext uri="{BB962C8B-B14F-4D97-AF65-F5344CB8AC3E}">
@@ -16557,18 +16625,18 @@
               <a:t>the </a:t>
             </a:r>
             <a:r>
-              <a:rPr lang="en-US" dirty="0" smtClean="0">
+              <a:rPr lang="en-US" b="1" dirty="0" smtClean="0">
                 <a:latin typeface="Courier"/>
                 <a:cs typeface="Courier"/>
               </a:rPr>
               <a:t>-t</a:t>
             </a:r>
             <a:r>
-              <a:rPr lang="en-US" dirty="0" smtClean="0"/>
+              <a:rPr lang="en-US" b="1" dirty="0" smtClean="0"/>
               <a:t> </a:t>
             </a:r>
             <a:r>
-              <a:rPr lang="en-US" dirty="0" smtClean="0">
+              <a:rPr lang="en-US" b="1" dirty="0" smtClean="0">
                 <a:latin typeface="Courier"/>
                 <a:cs typeface="Courier"/>
               </a:rPr>
@@ -20601,8 +20669,8 @@
         </p:nvSpPr>
         <p:spPr>
           <a:xfrm>
-            <a:off x="755576" y="2960948"/>
-            <a:ext cx="7562850" cy="504056"/>
+            <a:off x="3131840" y="1664804"/>
+            <a:ext cx="3168352" cy="504056"/>
           </a:xfrm>
           <a:prstGeom prst="rect">
             <a:avLst/>
@@ -20617,12 +20685,42 @@
             </a:pPr>
             <a:r>
               <a:rPr lang="en-US" b="1" dirty="0" smtClean="0"/>
-              <a:t>Demo</a:t>
+              <a:t>Questions?</a:t>
             </a:r>
             <a:endParaRPr lang="en-US" b="1" dirty="0"/>
           </a:p>
         </p:txBody>
       </p:sp>
+      <p:pic>
+        <p:nvPicPr>
+          <p:cNvPr id="2" name="Picture 1" descr="pgdb_logo.pdf"/>
+          <p:cNvPicPr>
+            <a:picLocks noChangeAspect="1"/>
+          </p:cNvPicPr>
+          <p:nvPr/>
+        </p:nvPicPr>
+        <p:blipFill>
+          <a:blip r:embed="rId3">
+            <a:extLst>
+              <a:ext uri="{28A0092B-C50C-407E-A947-70E740481C1C}">
+                <a14:useLocalDpi xmlns:a14="http://schemas.microsoft.com/office/drawing/2010/main" val="0"/>
+              </a:ext>
+            </a:extLst>
+          </a:blip>
+          <a:stretch>
+            <a:fillRect/>
+          </a:stretch>
+        </p:blipFill>
+        <p:spPr>
+          <a:xfrm>
+            <a:off x="2840403" y="2132856"/>
+            <a:ext cx="3387781" cy="3033246"/>
+          </a:xfrm>
+          <a:prstGeom prst="rect">
+            <a:avLst/>
+          </a:prstGeom>
+        </p:spPr>
+      </p:pic>
     </p:spTree>
     <p:extLst>
       <p:ext uri="{BB962C8B-B14F-4D97-AF65-F5344CB8AC3E}">

</xml_diff>

<commit_message>
Added Steven's slides to intro/ directory
</commit_message>
<xml_diff>
--- a/pathway_analysis/files/MetaPathways_Tutorial_Pathway_Analysis.pptx
+++ b/pathway_analysis/files/MetaPathways_Tutorial_Pathway_Analysis.pptx
@@ -18500,7 +18500,9 @@
               <a:t>Presentation Slides: </a:t>
             </a:r>
             <a:r>
-              <a:rPr lang="en-US" dirty="0" err="1"/>
+              <a:rPr lang="en-US" dirty="0" err="1">
+                <a:hlinkClick r:id="rId2"/>
+              </a:rPr>
               <a:t>MetaPathways_Tutorial_Pathway_Analysis.pdf</a:t>
             </a:r>
             <a:endParaRPr lang="en-US" dirty="0"/>
@@ -18534,7 +18536,9 @@
               <a:t>: </a:t>
             </a:r>
             <a:r>
-              <a:rPr lang="en-US" dirty="0" err="1"/>
+              <a:rPr lang="en-US" dirty="0" err="1">
+                <a:hlinkClick r:id="rId3"/>
+              </a:rPr>
               <a:t>HOT_Sanger_ePGDBs.zip</a:t>
             </a:r>
             <a:endParaRPr lang="en-US" dirty="0"/>
@@ -18552,7 +18556,9 @@
               <a:t>Perl Pathway Extractor Script: </a:t>
             </a:r>
             <a:r>
-              <a:rPr lang="en-US" dirty="0" err="1"/>
+              <a:rPr lang="en-US" dirty="0" err="1">
+                <a:hlinkClick r:id="rId4"/>
+              </a:rPr>
               <a:t>extract_pathway_table_from_pgdb.pl</a:t>
             </a:r>
             <a:endParaRPr lang="en-US" dirty="0"/>
@@ -18581,7 +18587,9 @@
               <a:rPr lang="en-US" dirty="0" smtClean="0"/>
             </a:br>
             <a:r>
-              <a:rPr lang="en-US" dirty="0" smtClean="0"/>
+              <a:rPr lang="en-US" dirty="0" smtClean="0">
+                <a:hlinkClick r:id="rId5"/>
+              </a:rPr>
               <a:t>1_upper_euphotic_rxn.wide.txt</a:t>
             </a:r>
             <a:r>
@@ -18589,7 +18597,9 @@
               <a:t>, </a:t>
             </a:r>
             <a:r>
-              <a:rPr lang="en-US" dirty="0" err="1"/>
+              <a:rPr lang="en-US" dirty="0" err="1">
+                <a:hlinkClick r:id="rId6"/>
+              </a:rPr>
               <a:t>HOT_Sanger_rxn.wide.txt</a:t>
             </a:r>
             <a:r>
@@ -18649,21 +18659,21 @@
             <a:r>
               <a:rPr lang="en-US" sz="1800" dirty="0" smtClean="0">
                 <a:latin typeface="+mj-lt"/>
-                <a:hlinkClick r:id="rId2"/>
+                <a:hlinkClick r:id="rId7"/>
               </a:rPr>
               <a:t>http</a:t>
             </a:r>
             <a:r>
               <a:rPr lang="en-US" sz="1800" dirty="0">
                 <a:latin typeface="+mj-lt"/>
-                <a:hlinkClick r:id="rId2"/>
+                <a:hlinkClick r:id="rId7"/>
               </a:rPr>
               <a:t>://biocyc.org/download-</a:t>
             </a:r>
             <a:r>
               <a:rPr lang="en-US" sz="1800" dirty="0" smtClean="0">
                 <a:latin typeface="+mj-lt"/>
-                <a:hlinkClick r:id="rId2"/>
+                <a:hlinkClick r:id="rId7"/>
               </a:rPr>
               <a:t>bundle.shtml</a:t>
             </a:r>
@@ -18688,14 +18698,14 @@
             <a:r>
               <a:rPr lang="en-US" sz="1800" dirty="0">
                 <a:latin typeface="+mj-lt"/>
-                <a:hlinkClick r:id="rId3"/>
+                <a:hlinkClick r:id="rId8"/>
               </a:rPr>
               <a:t>http://www.perl.org</a:t>
             </a:r>
             <a:r>
               <a:rPr lang="en-US" sz="1800" dirty="0" smtClean="0">
                 <a:latin typeface="+mj-lt"/>
-                <a:hlinkClick r:id="rId3"/>
+                <a:hlinkClick r:id="rId8"/>
               </a:rPr>
               <a:t>/</a:t>
             </a:r>

</xml_diff>